<commit_message>
Added analysis of feature_00 across symbols.
</commit_message>
<xml_diff>
--- a/documents/JS_competition.pptx
+++ b/documents/JS_competition.pptx
@@ -18,6 +18,7 @@
     <p:sldId id="268" r:id="rId12"/>
     <p:sldId id="266" r:id="rId13"/>
     <p:sldId id="267" r:id="rId14"/>
+    <p:sldId id="269" r:id="rId15"/>
   </p:sldIdLst>
   <p:sldSz cx="12192000" cy="6858000"/>
   <p:notesSz cx="6858000" cy="9144000"/>
@@ -116,6 +117,11 @@
       </a:defRPr>
     </a:lvl9pPr>
   </p:defaultTextStyle>
+  <p:extLst>
+    <p:ext uri="{EFAFB233-063F-42B5-8137-9DF3F51BA10A}">
+      <p15:sldGuideLst xmlns:p15="http://schemas.microsoft.com/office/powerpoint/2012/main"/>
+    </p:ext>
+  </p:extLst>
 </p:presentation>
 </file>
 
@@ -266,7 +272,7 @@
           <a:p>
             <a:fld id="{1CF575D7-D3CC-459C-81EA-A26F4E082E90}" type="datetimeFigureOut">
               <a:rPr lang="en-US" smtClean="0"/>
-              <a:t>11/5/2024</a:t>
+              <a:t>11/7/2024</a:t>
             </a:fld>
             <a:endParaRPr lang="en-US"/>
           </a:p>
@@ -464,7 +470,7 @@
           <a:p>
             <a:fld id="{1CF575D7-D3CC-459C-81EA-A26F4E082E90}" type="datetimeFigureOut">
               <a:rPr lang="en-US" smtClean="0"/>
-              <a:t>11/5/2024</a:t>
+              <a:t>11/7/2024</a:t>
             </a:fld>
             <a:endParaRPr lang="en-US"/>
           </a:p>
@@ -672,7 +678,7 @@
           <a:p>
             <a:fld id="{1CF575D7-D3CC-459C-81EA-A26F4E082E90}" type="datetimeFigureOut">
               <a:rPr lang="en-US" smtClean="0"/>
-              <a:t>11/5/2024</a:t>
+              <a:t>11/7/2024</a:t>
             </a:fld>
             <a:endParaRPr lang="en-US"/>
           </a:p>
@@ -870,7 +876,7 @@
           <a:p>
             <a:fld id="{1CF575D7-D3CC-459C-81EA-A26F4E082E90}" type="datetimeFigureOut">
               <a:rPr lang="en-US" smtClean="0"/>
-              <a:t>11/5/2024</a:t>
+              <a:t>11/7/2024</a:t>
             </a:fld>
             <a:endParaRPr lang="en-US"/>
           </a:p>
@@ -1145,7 +1151,7 @@
           <a:p>
             <a:fld id="{1CF575D7-D3CC-459C-81EA-A26F4E082E90}" type="datetimeFigureOut">
               <a:rPr lang="en-US" smtClean="0"/>
-              <a:t>11/5/2024</a:t>
+              <a:t>11/7/2024</a:t>
             </a:fld>
             <a:endParaRPr lang="en-US"/>
           </a:p>
@@ -1410,7 +1416,7 @@
           <a:p>
             <a:fld id="{1CF575D7-D3CC-459C-81EA-A26F4E082E90}" type="datetimeFigureOut">
               <a:rPr lang="en-US" smtClean="0"/>
-              <a:t>11/5/2024</a:t>
+              <a:t>11/7/2024</a:t>
             </a:fld>
             <a:endParaRPr lang="en-US"/>
           </a:p>
@@ -1822,7 +1828,7 @@
           <a:p>
             <a:fld id="{1CF575D7-D3CC-459C-81EA-A26F4E082E90}" type="datetimeFigureOut">
               <a:rPr lang="en-US" smtClean="0"/>
-              <a:t>11/5/2024</a:t>
+              <a:t>11/7/2024</a:t>
             </a:fld>
             <a:endParaRPr lang="en-US"/>
           </a:p>
@@ -1963,7 +1969,7 @@
           <a:p>
             <a:fld id="{1CF575D7-D3CC-459C-81EA-A26F4E082E90}" type="datetimeFigureOut">
               <a:rPr lang="en-US" smtClean="0"/>
-              <a:t>11/5/2024</a:t>
+              <a:t>11/7/2024</a:t>
             </a:fld>
             <a:endParaRPr lang="en-US"/>
           </a:p>
@@ -2076,7 +2082,7 @@
           <a:p>
             <a:fld id="{1CF575D7-D3CC-459C-81EA-A26F4E082E90}" type="datetimeFigureOut">
               <a:rPr lang="en-US" smtClean="0"/>
-              <a:t>11/5/2024</a:t>
+              <a:t>11/7/2024</a:t>
             </a:fld>
             <a:endParaRPr lang="en-US"/>
           </a:p>
@@ -2387,7 +2393,7 @@
           <a:p>
             <a:fld id="{1CF575D7-D3CC-459C-81EA-A26F4E082E90}" type="datetimeFigureOut">
               <a:rPr lang="en-US" smtClean="0"/>
-              <a:t>11/5/2024</a:t>
+              <a:t>11/7/2024</a:t>
             </a:fld>
             <a:endParaRPr lang="en-US"/>
           </a:p>
@@ -2675,7 +2681,7 @@
           <a:p>
             <a:fld id="{1CF575D7-D3CC-459C-81EA-A26F4E082E90}" type="datetimeFigureOut">
               <a:rPr lang="en-US" smtClean="0"/>
-              <a:t>11/5/2024</a:t>
+              <a:t>11/7/2024</a:t>
             </a:fld>
             <a:endParaRPr lang="en-US"/>
           </a:p>
@@ -2916,7 +2922,7 @@
           <a:p>
             <a:fld id="{1CF575D7-D3CC-459C-81EA-A26F4E082E90}" type="datetimeFigureOut">
               <a:rPr lang="en-US" smtClean="0"/>
-              <a:t>11/5/2024</a:t>
+              <a:t>11/7/2024</a:t>
             </a:fld>
             <a:endParaRPr lang="en-US"/>
           </a:p>
@@ -4137,6 +4143,212 @@
     <p:extLst>
       <p:ext uri="{BB962C8B-B14F-4D97-AF65-F5344CB8AC3E}">
         <p14:creationId xmlns:p14="http://schemas.microsoft.com/office/powerpoint/2010/main" val="819150742"/>
+      </p:ext>
+    </p:extLst>
+  </p:cSld>
+  <p:clrMapOvr>
+    <a:masterClrMapping/>
+  </p:clrMapOvr>
+</p:sld>
+</file>
+
+<file path=ppt/slides/slide14.xml><?xml version="1.0" encoding="utf-8"?>
+<p:sld xmlns:a="http://schemas.openxmlformats.org/drawingml/2006/main" xmlns:r="http://schemas.openxmlformats.org/officeDocument/2006/relationships" xmlns:p="http://schemas.openxmlformats.org/presentationml/2006/main">
+  <p:cSld>
+    <p:spTree>
+      <p:nvGrpSpPr>
+        <p:cNvPr id="1" name=""/>
+        <p:cNvGrpSpPr/>
+        <p:nvPr/>
+      </p:nvGrpSpPr>
+      <p:grpSpPr>
+        <a:xfrm>
+          <a:off x="0" y="0"/>
+          <a:ext cx="0" cy="0"/>
+          <a:chOff x="0" y="0"/>
+          <a:chExt cx="0" cy="0"/>
+        </a:xfrm>
+      </p:grpSpPr>
+      <p:sp>
+        <p:nvSpPr>
+          <p:cNvPr id="2" name="Title 1">
+            <a:extLst>
+              <a:ext uri="{FF2B5EF4-FFF2-40B4-BE49-F238E27FC236}">
+                <a16:creationId xmlns:a16="http://schemas.microsoft.com/office/drawing/2014/main" id="{53D86DB8-1990-4E02-FDE3-4DBE2A67C39E}"/>
+              </a:ext>
+            </a:extLst>
+          </p:cNvPr>
+          <p:cNvSpPr>
+            <a:spLocks noGrp="1"/>
+          </p:cNvSpPr>
+          <p:nvPr>
+            <p:ph type="title"/>
+          </p:nvPr>
+        </p:nvSpPr>
+        <p:spPr/>
+        <p:txBody>
+          <a:bodyPr/>
+          <a:lstStyle/>
+          <a:p>
+            <a:r>
+              <a:rPr lang="en-US" dirty="0"/>
+              <a:t>Feature 00 Across Symbols</a:t>
+            </a:r>
+          </a:p>
+        </p:txBody>
+      </p:sp>
+      <p:pic>
+        <p:nvPicPr>
+          <p:cNvPr id="5" name="Content Placeholder 4" descr="A graph of blue lines&#10;&#10;Description automatically generated with medium confidence">
+            <a:extLst>
+              <a:ext uri="{FF2B5EF4-FFF2-40B4-BE49-F238E27FC236}">
+                <a16:creationId xmlns:a16="http://schemas.microsoft.com/office/drawing/2014/main" id="{3B3DEDE2-0862-D0D3-5C59-C7A63370D34E}"/>
+              </a:ext>
+            </a:extLst>
+          </p:cNvPr>
+          <p:cNvPicPr>
+            <a:picLocks noGrp="1" noChangeAspect="1"/>
+          </p:cNvPicPr>
+          <p:nvPr>
+            <p:ph idx="1"/>
+          </p:nvPr>
+        </p:nvPicPr>
+        <p:blipFill>
+          <a:blip r:embed="rId2">
+            <a:extLst>
+              <a:ext uri="{28A0092B-C50C-407E-A947-70E740481C1C}">
+                <a14:useLocalDpi xmlns:a14="http://schemas.microsoft.com/office/drawing/2010/main" val="0"/>
+              </a:ext>
+            </a:extLst>
+          </a:blip>
+          <a:stretch>
+            <a:fillRect/>
+          </a:stretch>
+        </p:blipFill>
+        <p:spPr>
+          <a:xfrm>
+            <a:off x="716012" y="1246999"/>
+            <a:ext cx="5245876" cy="5245876"/>
+          </a:xfrm>
+        </p:spPr>
+      </p:pic>
+      <p:pic>
+        <p:nvPicPr>
+          <p:cNvPr id="7" name="Picture 6" descr="A graph of a number of symbols&#10;&#10;Description automatically generated">
+            <a:extLst>
+              <a:ext uri="{FF2B5EF4-FFF2-40B4-BE49-F238E27FC236}">
+                <a16:creationId xmlns:a16="http://schemas.microsoft.com/office/drawing/2014/main" id="{90789FDA-BD05-7032-6693-9D85F1358A66}"/>
+              </a:ext>
+            </a:extLst>
+          </p:cNvPr>
+          <p:cNvPicPr>
+            <a:picLocks noChangeAspect="1"/>
+          </p:cNvPicPr>
+          <p:nvPr/>
+        </p:nvPicPr>
+        <p:blipFill>
+          <a:blip r:embed="rId3">
+            <a:extLst>
+              <a:ext uri="{28A0092B-C50C-407E-A947-70E740481C1C}">
+                <a14:useLocalDpi xmlns:a14="http://schemas.microsoft.com/office/drawing/2010/main" val="0"/>
+              </a:ext>
+            </a:extLst>
+          </a:blip>
+          <a:stretch>
+            <a:fillRect/>
+          </a:stretch>
+        </p:blipFill>
+        <p:spPr>
+          <a:xfrm>
+            <a:off x="6943338" y="1471884"/>
+            <a:ext cx="3663702" cy="2747777"/>
+          </a:xfrm>
+          <a:prstGeom prst="rect">
+            <a:avLst/>
+          </a:prstGeom>
+        </p:spPr>
+      </p:pic>
+      <p:sp>
+        <p:nvSpPr>
+          <p:cNvPr id="8" name="TextBox 7">
+            <a:extLst>
+              <a:ext uri="{FF2B5EF4-FFF2-40B4-BE49-F238E27FC236}">
+                <a16:creationId xmlns:a16="http://schemas.microsoft.com/office/drawing/2014/main" id="{DCA186A5-9CD3-99C5-0230-04FADEE92235}"/>
+              </a:ext>
+            </a:extLst>
+          </p:cNvPr>
+          <p:cNvSpPr txBox="1"/>
+          <p:nvPr/>
+        </p:nvSpPr>
+        <p:spPr>
+          <a:xfrm>
+            <a:off x="7034784" y="4329389"/>
+            <a:ext cx="4678680" cy="2308324"/>
+          </a:xfrm>
+          <a:prstGeom prst="rect">
+            <a:avLst/>
+          </a:prstGeom>
+          <a:noFill/>
+        </p:spPr>
+        <p:txBody>
+          <a:bodyPr wrap="square" rtlCol="0">
+            <a:spAutoFit/>
+          </a:bodyPr>
+          <a:lstStyle/>
+          <a:p>
+            <a:pPr marL="285750" indent="-285750">
+              <a:buFont typeface="Arial" panose="020B0604020202020204" pitchFamily="34" charset="0"/>
+              <a:buChar char="•"/>
+            </a:pPr>
+            <a:r>
+              <a:rPr lang="en-US" dirty="0"/>
+              <a:t>At least visually, the ‘transitions’ seem to happen at the same time</a:t>
+            </a:r>
+          </a:p>
+          <a:p>
+            <a:pPr marL="285750" indent="-285750">
+              <a:buFont typeface="Arial" panose="020B0604020202020204" pitchFamily="34" charset="0"/>
+              <a:buChar char="•"/>
+            </a:pPr>
+            <a:r>
+              <a:rPr lang="en-US" dirty="0"/>
+              <a:t>The correlation between symbols is extremely high</a:t>
+            </a:r>
+          </a:p>
+          <a:p>
+            <a:pPr marL="742950" lvl="1" indent="-285750">
+              <a:buFont typeface="Arial" panose="020B0604020202020204" pitchFamily="34" charset="0"/>
+              <a:buChar char="•"/>
+            </a:pPr>
+            <a:r>
+              <a:rPr lang="en-US" dirty="0"/>
+              <a:t>Either it reflects a ‘fundamental’ signal</a:t>
+            </a:r>
+          </a:p>
+          <a:p>
+            <a:pPr marL="742950" lvl="1" indent="-285750">
+              <a:buFont typeface="Arial" panose="020B0604020202020204" pitchFamily="34" charset="0"/>
+              <a:buChar char="•"/>
+            </a:pPr>
+            <a:r>
+              <a:rPr lang="en-US" dirty="0"/>
+              <a:t>Or we need to pre-process it to extract the relevant piece for each </a:t>
+            </a:r>
+            <a:r>
+              <a:rPr lang="en-US" dirty="0" err="1"/>
+              <a:t>symsbol</a:t>
+            </a:r>
+            <a:r>
+              <a:rPr lang="en-US" dirty="0"/>
+              <a:t> </a:t>
+            </a:r>
+          </a:p>
+        </p:txBody>
+      </p:sp>
+    </p:spTree>
+    <p:extLst>
+      <p:ext uri="{BB962C8B-B14F-4D97-AF65-F5344CB8AC3E}">
+        <p14:creationId xmlns:p14="http://schemas.microsoft.com/office/powerpoint/2010/main" val="1277823863"/>
       </p:ext>
     </p:extLst>
   </p:cSld>

</xml_diff>